<commit_message>
Index updates; lecture slide uploads
</commit_message>
<xml_diff>
--- a/eece2160/lectures/eece.2160_lec3_vars_op_printf.pptx
+++ b/eece2160/lectures/eece.2160_lec3_vars_op_printf.pptx
@@ -220,7 +220,7 @@
 <file path=ppt/revisionInfo.xml><?xml version="1.0" encoding="utf-8"?>
 <p1510:revInfo xmlns:a="http://schemas.openxmlformats.org/drawingml/2006/main" xmlns:r="http://schemas.openxmlformats.org/officeDocument/2006/relationships" xmlns:p1510="http://schemas.microsoft.com/office/powerpoint/2015/10/main">
   <p1510:revLst>
-    <p1510:client id="{EA75E60B-995B-406C-B9EB-ADB60C1CF3CC}" v="6" dt="2019-09-08T21:06:19.717"/>
+    <p1510:client id="{24C03EE5-EA7C-4F9F-AD94-F88A62C722AC}" v="1" dt="2020-01-27T16:16:37.189"/>
   </p1510:revLst>
 </p1510:revInfo>
 </file>
@@ -433,6 +433,75 @@
           <pc:docMk/>
           <pc:sldMk cId="1247848263" sldId="478"/>
         </pc:sldMkLst>
+      </pc:sldChg>
+    </pc:docChg>
+  </pc:docChgLst>
+  <pc:docChgLst>
+    <pc:chgData name="Geiger, Michael J" userId="13cae92b-b37c-450b-a449-82fcae19569d" providerId="ADAL" clId="{24C03EE5-EA7C-4F9F-AD94-F88A62C722AC}"/>
+    <pc:docChg chg="undo custSel modSld">
+      <pc:chgData name="Geiger, Michael J" userId="13cae92b-b37c-450b-a449-82fcae19569d" providerId="ADAL" clId="{24C03EE5-EA7C-4F9F-AD94-F88A62C722AC}" dt="2020-01-27T16:16:53.222" v="134" actId="20577"/>
+      <pc:docMkLst>
+        <pc:docMk/>
+      </pc:docMkLst>
+      <pc:sldChg chg="modSp">
+        <pc:chgData name="Geiger, Michael J" userId="13cae92b-b37c-450b-a449-82fcae19569d" providerId="ADAL" clId="{24C03EE5-EA7C-4F9F-AD94-F88A62C722AC}" dt="2020-01-27T16:14:36.444" v="40" actId="20577"/>
+        <pc:sldMkLst>
+          <pc:docMk/>
+          <pc:sldMk cId="0" sldId="256"/>
+        </pc:sldMkLst>
+        <pc:spChg chg="mod">
+          <ac:chgData name="Geiger, Michael J" userId="13cae92b-b37c-450b-a449-82fcae19569d" providerId="ADAL" clId="{24C03EE5-EA7C-4F9F-AD94-F88A62C722AC}" dt="2020-01-27T16:14:36.444" v="40" actId="20577"/>
+          <ac:spMkLst>
+            <pc:docMk/>
+            <pc:sldMk cId="0" sldId="256"/>
+            <ac:spMk id="3075" creationId="{00000000-0000-0000-0000-000000000000}"/>
+          </ac:spMkLst>
+        </pc:spChg>
+      </pc:sldChg>
+      <pc:sldChg chg="modSp">
+        <pc:chgData name="Geiger, Michael J" userId="13cae92b-b37c-450b-a449-82fcae19569d" providerId="ADAL" clId="{24C03EE5-EA7C-4F9F-AD94-F88A62C722AC}" dt="2020-01-27T16:15:40.996" v="110" actId="20577"/>
+        <pc:sldMkLst>
+          <pc:docMk/>
+          <pc:sldMk cId="0" sldId="422"/>
+        </pc:sldMkLst>
+        <pc:spChg chg="mod">
+          <ac:chgData name="Geiger, Michael J" userId="13cae92b-b37c-450b-a449-82fcae19569d" providerId="ADAL" clId="{24C03EE5-EA7C-4F9F-AD94-F88A62C722AC}" dt="2020-01-27T16:15:40.996" v="110" actId="20577"/>
+          <ac:spMkLst>
+            <pc:docMk/>
+            <pc:sldMk cId="0" sldId="422"/>
+            <ac:spMk id="4099" creationId="{00000000-0000-0000-0000-000000000000}"/>
+          </ac:spMkLst>
+        </pc:spChg>
+      </pc:sldChg>
+      <pc:sldChg chg="modSp">
+        <pc:chgData name="Geiger, Michael J" userId="13cae92b-b37c-450b-a449-82fcae19569d" providerId="ADAL" clId="{24C03EE5-EA7C-4F9F-AD94-F88A62C722AC}" dt="2020-01-27T16:16:37.278" v="114" actId="27636"/>
+        <pc:sldMkLst>
+          <pc:docMk/>
+          <pc:sldMk cId="0" sldId="447"/>
+        </pc:sldMkLst>
+        <pc:spChg chg="mod">
+          <ac:chgData name="Geiger, Michael J" userId="13cae92b-b37c-450b-a449-82fcae19569d" providerId="ADAL" clId="{24C03EE5-EA7C-4F9F-AD94-F88A62C722AC}" dt="2020-01-27T16:16:37.278" v="114" actId="27636"/>
+          <ac:spMkLst>
+            <pc:docMk/>
+            <pc:sldMk cId="0" sldId="447"/>
+            <ac:spMk id="22531" creationId="{00000000-0000-0000-0000-000000000000}"/>
+          </ac:spMkLst>
+        </pc:spChg>
+      </pc:sldChg>
+      <pc:sldChg chg="modSp">
+        <pc:chgData name="Geiger, Michael J" userId="13cae92b-b37c-450b-a449-82fcae19569d" providerId="ADAL" clId="{24C03EE5-EA7C-4F9F-AD94-F88A62C722AC}" dt="2020-01-27T16:16:53.222" v="134" actId="20577"/>
+        <pc:sldMkLst>
+          <pc:docMk/>
+          <pc:sldMk cId="3215064812" sldId="471"/>
+        </pc:sldMkLst>
+        <pc:spChg chg="mod">
+          <ac:chgData name="Geiger, Michael J" userId="13cae92b-b37c-450b-a449-82fcae19569d" providerId="ADAL" clId="{24C03EE5-EA7C-4F9F-AD94-F88A62C722AC}" dt="2020-01-27T16:16:53.222" v="134" actId="20577"/>
+          <ac:spMkLst>
+            <pc:docMk/>
+            <pc:sldMk cId="3215064812" sldId="471"/>
+            <ac:spMk id="4099" creationId="{00000000-0000-0000-0000-000000000000}"/>
+          </ac:spMkLst>
+        </pc:spChg>
       </pc:sldChg>
     </pc:docChg>
   </pc:docChgLst>
@@ -3771,7 +3840,7 @@
           <a:p>
             <a:fld id="{A67714C3-FE4B-4773-AA5E-DEBF7CB6F824}" type="datetime1">
               <a:rPr lang="en-US" smtClean="0"/>
-              <a:t>9/8/2019</a:t>
+              <a:t>1/27/2020</a:t>
             </a:fld>
             <a:endParaRPr lang="en-US"/>
           </a:p>
@@ -3965,7 +4034,7 @@
           <a:p>
             <a:fld id="{ED665A55-2801-49CB-B960-88EFEEA9B0E3}" type="datetime1">
               <a:rPr lang="en-US" smtClean="0"/>
-              <a:t>9/8/2019</a:t>
+              <a:t>1/27/2020</a:t>
             </a:fld>
             <a:endParaRPr lang="en-US"/>
           </a:p>
@@ -4168,7 +4237,7 @@
           <a:p>
             <a:fld id="{D9EBE627-F7CD-4AEF-9E27-8497070B7229}" type="datetime1">
               <a:rPr lang="en-US" smtClean="0"/>
-              <a:t>9/8/2019</a:t>
+              <a:t>1/27/2020</a:t>
             </a:fld>
             <a:endParaRPr lang="en-US"/>
           </a:p>
@@ -4427,7 +4496,7 @@
           <a:p>
             <a:fld id="{A6CFCECC-FE73-448D-AB72-8F4046E5FC3D}" type="datetime1">
               <a:rPr lang="en-US" smtClean="0"/>
-              <a:t>9/8/2019</a:t>
+              <a:t>1/27/2020</a:t>
             </a:fld>
             <a:endParaRPr lang="en-US"/>
           </a:p>
@@ -4686,7 +4755,7 @@
           <a:p>
             <a:fld id="{5BFB1B39-6572-4A74-8A32-A3307C28C6C0}" type="datetime1">
               <a:rPr lang="en-US" smtClean="0"/>
-              <a:t>9/8/2019</a:t>
+              <a:t>1/27/2020</a:t>
             </a:fld>
             <a:endParaRPr lang="en-US"/>
           </a:p>
@@ -4879,7 +4948,7 @@
           <a:p>
             <a:fld id="{2C0B43B1-1033-4AAA-8FCA-ED34A758D34D}" type="datetime1">
               <a:rPr lang="en-US" smtClean="0"/>
-              <a:t>9/8/2019</a:t>
+              <a:t>1/27/2020</a:t>
             </a:fld>
             <a:endParaRPr lang="en-US"/>
           </a:p>
@@ -5095,7 +5164,7 @@
           <a:p>
             <a:fld id="{53E43953-6407-449C-A4CE-4CC1F9BC3A9E}" type="datetime1">
               <a:rPr lang="en-US" smtClean="0"/>
-              <a:t>9/8/2019</a:t>
+              <a:t>1/27/2020</a:t>
             </a:fld>
             <a:endParaRPr lang="en-US"/>
           </a:p>
@@ -5405,7 +5474,7 @@
           <a:p>
             <a:fld id="{D0305A4C-9550-4F64-A619-CA7310B41FAE}" type="datetime1">
               <a:rPr lang="en-US" smtClean="0"/>
-              <a:t>9/8/2019</a:t>
+              <a:t>1/27/2020</a:t>
             </a:fld>
             <a:endParaRPr lang="en-US"/>
           </a:p>
@@ -5854,7 +5923,7 @@
           <a:p>
             <a:fld id="{45AF890B-C0CF-4749-BDDD-12A2B0227C0B}" type="datetime1">
               <a:rPr lang="en-US" smtClean="0"/>
-              <a:t>9/8/2019</a:t>
+              <a:t>1/27/2020</a:t>
             </a:fld>
             <a:endParaRPr lang="en-US"/>
           </a:p>
@@ -5996,7 +6065,7 @@
           <a:p>
             <a:fld id="{6AC353E7-C407-455D-97AD-B96B496A92D6}" type="datetime1">
               <a:rPr lang="en-US" smtClean="0"/>
-              <a:t>9/8/2019</a:t>
+              <a:t>1/27/2020</a:t>
             </a:fld>
             <a:endParaRPr lang="en-US"/>
           </a:p>
@@ -6116,7 +6185,7 @@
           <a:p>
             <a:fld id="{A6EF7171-97A1-4119-96A1-75927C6AE762}" type="datetime1">
               <a:rPr lang="en-US" smtClean="0"/>
-              <a:t>9/8/2019</a:t>
+              <a:t>1/27/2020</a:t>
             </a:fld>
             <a:endParaRPr lang="en-US"/>
           </a:p>
@@ -6416,7 +6485,7 @@
           <a:p>
             <a:fld id="{AEDB4BFC-096F-43E2-A2E8-B0185EAEC452}" type="datetime1">
               <a:rPr lang="en-US" smtClean="0"/>
-              <a:t>9/8/2019</a:t>
+              <a:t>1/27/2020</a:t>
             </a:fld>
             <a:endParaRPr lang="en-US"/>
           </a:p>
@@ -6694,7 +6763,7 @@
           <a:p>
             <a:fld id="{3AAF6335-CFAD-41C5-8624-5AD1E7977518}" type="datetime1">
               <a:rPr lang="en-US" smtClean="0"/>
-              <a:t>9/8/2019</a:t>
+              <a:t>1/27/2020</a:t>
             </a:fld>
             <a:endParaRPr lang="en-US"/>
           </a:p>
@@ -6992,7 +7061,7 @@
           <a:p>
             <a:fld id="{547507EF-BBAB-4470-9E50-A3F394176739}" type="datetime1">
               <a:rPr lang="en-US" smtClean="0"/>
-              <a:t>9/8/2019</a:t>
+              <a:t>1/27/2020</a:t>
             </a:fld>
             <a:endParaRPr lang="en-US"/>
           </a:p>
@@ -7785,7 +7854,7 @@
               <a:rPr lang="en-US" dirty="0">
                 <a:latin typeface="Arial" charset="0"/>
               </a:rPr>
-              <a:t>Fall 2019</a:t>
+              <a:t>Spring 2020</a:t>
             </a:r>
           </a:p>
           <a:p>
@@ -8510,7 +8579,7 @@
               <a:rPr lang="en-US" sz="1200" smtClean="0">
                 <a:latin typeface="Garamond" charset="0"/>
               </a:rPr>
-              <a:t>9/8/2019</a:t>
+              <a:t>1/27/2020</a:t>
             </a:fld>
             <a:endParaRPr lang="en-US" sz="1200">
               <a:latin typeface="Garamond" charset="0"/>
@@ -9080,7 +9149,7 @@
               <a:rPr lang="en-US" sz="1200" smtClean="0">
                 <a:latin typeface="Garamond" charset="0"/>
               </a:rPr>
-              <a:t>9/8/2019</a:t>
+              <a:t>1/27/2020</a:t>
             </a:fld>
             <a:endParaRPr lang="en-US" sz="1200">
               <a:latin typeface="Garamond" charset="0"/>
@@ -9718,7 +9787,7 @@
               <a:rPr lang="en-US" sz="1200" smtClean="0">
                 <a:latin typeface="Garamond" charset="0"/>
               </a:rPr>
-              <a:t>9/8/2019</a:t>
+              <a:t>1/27/2020</a:t>
             </a:fld>
             <a:endParaRPr lang="en-US" sz="1200">
               <a:latin typeface="Garamond" charset="0"/>
@@ -10194,7 +10263,7 @@
               <a:rPr lang="en-US" smtClean="0">
                 <a:latin typeface="Garamond" charset="0"/>
               </a:rPr>
-              <a:t>9/8/2019</a:t>
+              <a:t>1/27/2020</a:t>
             </a:fld>
             <a:endParaRPr lang="en-US">
               <a:latin typeface="Garamond" charset="0"/>
@@ -13013,7 +13082,7 @@
               <a:rPr lang="en-US" smtClean="0">
                 <a:latin typeface="Garamond" charset="0"/>
               </a:rPr>
-              <a:t>9/8/2019</a:t>
+              <a:t>1/27/2020</a:t>
             </a:fld>
             <a:endParaRPr lang="en-US">
               <a:latin typeface="Garamond" charset="0"/>
@@ -13481,7 +13550,7 @@
               <a:rPr lang="en-US" smtClean="0">
                 <a:latin typeface="Garamond" charset="0"/>
               </a:rPr>
-              <a:t>9/8/2019</a:t>
+              <a:t>1/27/2020</a:t>
             </a:fld>
             <a:endParaRPr lang="en-US">
               <a:latin typeface="Garamond" charset="0"/>
@@ -14170,7 +14239,7 @@
               <a:rPr lang="en-US" smtClean="0">
                 <a:latin typeface="Garamond" charset="0"/>
               </a:rPr>
-              <a:t>9/8/2019</a:t>
+              <a:t>1/27/2020</a:t>
             </a:fld>
             <a:endParaRPr lang="en-US">
               <a:latin typeface="Garamond" charset="0"/>
@@ -14610,7 +14679,7 @@
               <a:rPr lang="en-US" smtClean="0">
                 <a:latin typeface="Garamond" charset="0"/>
               </a:rPr>
-              <a:t>9/8/2019</a:t>
+              <a:t>1/27/2020</a:t>
             </a:fld>
             <a:endParaRPr lang="en-US">
               <a:latin typeface="Garamond" charset="0"/>
@@ -15083,7 +15152,7 @@
               <a:rPr lang="en-US" smtClean="0">
                 <a:latin typeface="Garamond" charset="0"/>
               </a:rPr>
-              <a:t>9/8/2019</a:t>
+              <a:t>1/27/2020</a:t>
             </a:fld>
             <a:endParaRPr lang="en-US">
               <a:latin typeface="Garamond" charset="0"/>
@@ -17149,7 +17218,7 @@
               <a:rPr lang="en-US" smtClean="0">
                 <a:latin typeface="Garamond" charset="0"/>
               </a:rPr>
-              <a:t>9/8/2019</a:t>
+              <a:t>1/27/2020</a:t>
             </a:fld>
             <a:endParaRPr lang="en-US">
               <a:latin typeface="Garamond" charset="0"/>
@@ -17299,7 +17368,7 @@
         <p:spPr/>
         <p:txBody>
           <a:bodyPr>
-            <a:normAutofit fontScale="85000" lnSpcReduction="20000"/>
+            <a:normAutofit fontScale="77500" lnSpcReduction="20000"/>
           </a:bodyPr>
           <a:lstStyle/>
           <a:p>
@@ -17329,7 +17398,7 @@
           <a:p>
             <a:r>
               <a:rPr lang="en-US" altLang="en-US" dirty="0"/>
-              <a:t>Text exercises: Ch. 1 due today, Ch. 2 due 9/18</a:t>
+              <a:t>Text: Ch. 1 due today (1/27), Ch. 2 due 1/31</a:t>
             </a:r>
           </a:p>
           <a:p>
@@ -17346,7 +17415,7 @@
           <a:p>
             <a:r>
               <a:rPr lang="en-US" dirty="0"/>
-              <a:t>Program 1 due Wednesday, 9/11</a:t>
+              <a:t>Program 1 due Wednesday, 1/29</a:t>
             </a:r>
           </a:p>
           <a:p>
@@ -17392,7 +17461,14 @@
             </a:r>
           </a:p>
           <a:p>
-            <a:endParaRPr lang="en-US" dirty="0"/>
+            <a:pPr lvl="1"/>
+            <a:endParaRPr lang="en-US" altLang="en-US" dirty="0"/>
+          </a:p>
+          <a:p>
+            <a:r>
+              <a:rPr lang="en-US" dirty="0"/>
+              <a:t>Dr. Geiger’s Tuesday office hours moved to 10:30-12</a:t>
+            </a:r>
           </a:p>
         </p:txBody>
       </p:sp>
@@ -17530,7 +17606,7 @@
               <a:rPr lang="en-US" smtClean="0">
                 <a:latin typeface="+mj-lt"/>
               </a:rPr>
-              <a:t>9/8/2019</a:t>
+              <a:t>1/27/2020</a:t>
             </a:fld>
             <a:endParaRPr lang="en-US" dirty="0">
               <a:latin typeface="+mj-lt"/>
@@ -18630,7 +18706,7 @@
               <a:rPr lang="en-US" smtClean="0">
                 <a:latin typeface="Garamond" charset="0"/>
               </a:rPr>
-              <a:t>9/8/2019</a:t>
+              <a:t>1/27/2020</a:t>
             </a:fld>
             <a:endParaRPr lang="en-US">
               <a:latin typeface="Garamond" charset="0"/>
@@ -20717,7 +20793,7 @@
               <a:rPr lang="en-US" smtClean="0">
                 <a:latin typeface="Garamond" charset="0"/>
               </a:rPr>
-              <a:t>9/8/2019</a:t>
+              <a:t>1/27/2020</a:t>
             </a:fld>
             <a:endParaRPr lang="en-US">
               <a:latin typeface="Garamond" charset="0"/>
@@ -22825,7 +22901,7 @@
               <a:rPr lang="en-US" smtClean="0">
                 <a:latin typeface="Garamond" charset="0"/>
               </a:rPr>
-              <a:t>9/8/2019</a:t>
+              <a:t>1/27/2020</a:t>
             </a:fld>
             <a:endParaRPr lang="en-US">
               <a:latin typeface="Garamond" charset="0"/>
@@ -25107,7 +25183,7 @@
               <a:rPr lang="en-US" smtClean="0">
                 <a:latin typeface="Garamond" charset="0"/>
               </a:rPr>
-              <a:t>9/8/2019</a:t>
+              <a:t>1/27/2020</a:t>
             </a:fld>
             <a:endParaRPr lang="en-US">
               <a:latin typeface="Garamond" charset="0"/>
@@ -27416,7 +27492,7 @@
               <a:rPr lang="en-US" smtClean="0">
                 <a:latin typeface="Garamond" charset="0"/>
               </a:rPr>
-              <a:t>9/8/2019</a:t>
+              <a:t>1/27/2020</a:t>
             </a:fld>
             <a:endParaRPr lang="en-US">
               <a:latin typeface="Garamond" charset="0"/>
@@ -29754,7 +29830,7 @@
               <a:rPr lang="en-US" smtClean="0">
                 <a:latin typeface="Garamond" charset="0"/>
               </a:rPr>
-              <a:t>9/8/2019</a:t>
+              <a:t>1/27/2020</a:t>
             </a:fld>
             <a:endParaRPr lang="en-US">
               <a:latin typeface="Garamond" charset="0"/>
@@ -30279,7 +30355,7 @@
               <a:rPr lang="en-US" smtClean="0">
                 <a:latin typeface="Garamond" charset="0"/>
               </a:rPr>
-              <a:t>9/8/2019</a:t>
+              <a:t>1/27/2020</a:t>
             </a:fld>
             <a:endParaRPr lang="en-US">
               <a:latin typeface="Garamond" charset="0"/>
@@ -30914,7 +30990,7 @@
               <a:rPr lang="en-US" smtClean="0">
                 <a:latin typeface="Garamond" charset="0"/>
               </a:rPr>
-              <a:t>9/8/2019</a:t>
+              <a:t>1/27/2020</a:t>
             </a:fld>
             <a:endParaRPr lang="en-US">
               <a:latin typeface="Garamond" charset="0"/>
@@ -32820,7 +32896,7 @@
               <a:rPr lang="en-US" smtClean="0">
                 <a:latin typeface="Garamond" charset="0"/>
               </a:rPr>
-              <a:t>9/8/2019</a:t>
+              <a:t>1/27/2020</a:t>
             </a:fld>
             <a:endParaRPr lang="en-US">
               <a:latin typeface="Garamond" charset="0"/>
@@ -33447,7 +33523,7 @@
               <a:rPr lang="en-US" smtClean="0">
                 <a:latin typeface="Garamond" charset="0"/>
               </a:rPr>
-              <a:t>9/8/2019</a:t>
+              <a:t>1/27/2020</a:t>
             </a:fld>
             <a:endParaRPr lang="en-US">
               <a:latin typeface="Garamond" charset="0"/>
@@ -33583,6 +33659,25 @@
               <a:t>Variables</a:t>
             </a:r>
           </a:p>
+          <a:p>
+            <a:pPr lvl="1"/>
+            <a:r>
+              <a:rPr lang="en-US" dirty="0"/>
+              <a:t>Operators</a:t>
+            </a:r>
+          </a:p>
+          <a:p>
+            <a:pPr lvl="1"/>
+            <a:r>
+              <a:rPr lang="en-US" dirty="0" err="1"/>
+              <a:t>printf</a:t>
+            </a:r>
+            <a:r>
+              <a:rPr lang="en-US"/>
+              <a:t>() basics</a:t>
+            </a:r>
+            <a:endParaRPr lang="en-US" dirty="0"/>
+          </a:p>
         </p:txBody>
       </p:sp>
       <p:sp>
@@ -33719,7 +33814,7 @@
               <a:rPr lang="en-US" smtClean="0">
                 <a:latin typeface="+mj-lt"/>
               </a:rPr>
-              <a:t>9/8/2019</a:t>
+              <a:t>1/27/2020</a:t>
             </a:fld>
             <a:endParaRPr lang="en-US" dirty="0">
               <a:latin typeface="+mj-lt"/>
@@ -34220,7 +34315,7 @@
               <a:rPr lang="en-US" smtClean="0">
                 <a:latin typeface="Garamond" charset="0"/>
               </a:rPr>
-              <a:t>9/8/2019</a:t>
+              <a:t>1/27/2020</a:t>
             </a:fld>
             <a:endParaRPr lang="en-US">
               <a:latin typeface="Garamond" charset="0"/>
@@ -34823,7 +34918,7 @@
               <a:rPr lang="en-US" smtClean="0">
                 <a:latin typeface="Garamond" charset="0"/>
               </a:rPr>
-              <a:t>9/8/2019</a:t>
+              <a:t>1/27/2020</a:t>
             </a:fld>
             <a:endParaRPr lang="en-US">
               <a:latin typeface="Garamond" charset="0"/>
@@ -35267,7 +35362,7 @@
               <a:rPr lang="en-US" smtClean="0">
                 <a:latin typeface="Garamond" charset="0"/>
               </a:rPr>
-              <a:t>9/8/2019</a:t>
+              <a:t>1/27/2020</a:t>
             </a:fld>
             <a:endParaRPr lang="en-US">
               <a:latin typeface="Garamond" charset="0"/>
@@ -35804,7 +35899,7 @@
               <a:rPr lang="en-US" smtClean="0">
                 <a:latin typeface="Garamond" charset="0"/>
               </a:rPr>
-              <a:t>9/8/2019</a:t>
+              <a:t>1/27/2020</a:t>
             </a:fld>
             <a:endParaRPr lang="en-US">
               <a:latin typeface="Garamond" charset="0"/>
@@ -36249,7 +36344,7 @@
               <a:rPr lang="en-US" smtClean="0">
                 <a:latin typeface="Garamond" charset="0"/>
               </a:rPr>
-              <a:t>9/8/2019</a:t>
+              <a:t>1/27/2020</a:t>
             </a:fld>
             <a:endParaRPr lang="en-US">
               <a:latin typeface="Garamond" charset="0"/>
@@ -36875,7 +36970,7 @@
               <a:rPr lang="en-US" smtClean="0">
                 <a:latin typeface="Garamond" charset="0"/>
               </a:rPr>
-              <a:t>9/8/2019</a:t>
+              <a:t>1/27/2020</a:t>
             </a:fld>
             <a:endParaRPr lang="en-US">
               <a:latin typeface="Garamond" charset="0"/>
@@ -37323,7 +37418,7 @@
               <a:rPr lang="en-US" smtClean="0">
                 <a:latin typeface="Garamond" charset="0"/>
               </a:rPr>
-              <a:t>9/8/2019</a:t>
+              <a:t>1/27/2020</a:t>
             </a:fld>
             <a:endParaRPr lang="en-US">
               <a:latin typeface="Garamond" charset="0"/>
@@ -38038,7 +38133,7 @@
               <a:rPr lang="en-US" smtClean="0">
                 <a:latin typeface="Garamond" charset="0"/>
               </a:rPr>
-              <a:t>9/8/2019</a:t>
+              <a:t>1/27/2020</a:t>
             </a:fld>
             <a:endParaRPr lang="en-US">
               <a:latin typeface="Garamond" charset="0"/>
@@ -38650,7 +38745,7 @@
               <a:rPr lang="en-US" smtClean="0">
                 <a:latin typeface="Garamond" charset="0"/>
               </a:rPr>
-              <a:t>9/8/2019</a:t>
+              <a:t>1/27/2020</a:t>
             </a:fld>
             <a:endParaRPr lang="en-US">
               <a:latin typeface="Garamond" charset="0"/>
@@ -39056,7 +39151,7 @@
               <a:rPr lang="en-US" smtClean="0">
                 <a:latin typeface="Garamond" charset="0"/>
               </a:rPr>
-              <a:t>9/8/2019</a:t>
+              <a:t>1/27/2020</a:t>
             </a:fld>
             <a:endParaRPr lang="en-US">
               <a:latin typeface="Garamond" charset="0"/>
@@ -39733,7 +39828,7 @@
               <a:rPr lang="en-US" altLang="en-US" sz="1200" smtClean="0">
                 <a:latin typeface="Garamond" panose="02020404030301010803" pitchFamily="18" charset="0"/>
               </a:rPr>
-              <a:t>9/8/2019</a:t>
+              <a:t>1/27/2020</a:t>
             </a:fld>
             <a:endParaRPr lang="en-US" altLang="en-US" sz="1200">
               <a:latin typeface="Garamond" panose="02020404030301010803" pitchFamily="18" charset="0"/>
@@ -42182,7 +42277,7 @@
               <a:rPr lang="en-US" smtClean="0">
                 <a:latin typeface="Garamond" charset="0"/>
               </a:rPr>
-              <a:t>9/8/2019</a:t>
+              <a:t>1/27/2020</a:t>
             </a:fld>
             <a:endParaRPr lang="en-US">
               <a:latin typeface="Garamond" charset="0"/>
@@ -42982,7 +43077,7 @@
               <a:rPr lang="en-US" smtClean="0">
                 <a:latin typeface="Garamond" charset="0"/>
               </a:rPr>
-              <a:t>9/8/2019</a:t>
+              <a:t>1/27/2020</a:t>
             </a:fld>
             <a:endParaRPr lang="en-US">
               <a:latin typeface="Garamond" charset="0"/>
@@ -43779,7 +43874,7 @@
               <a:rPr lang="en-US" smtClean="0">
                 <a:latin typeface="Garamond" charset="0"/>
               </a:rPr>
-              <a:t>9/8/2019</a:t>
+              <a:t>1/27/2020</a:t>
             </a:fld>
             <a:endParaRPr lang="en-US">
               <a:latin typeface="Garamond" charset="0"/>
@@ -44569,7 +44664,7 @@
               <a:rPr lang="en-US" smtClean="0">
                 <a:latin typeface="Garamond" charset="0"/>
               </a:rPr>
-              <a:t>9/8/2019</a:t>
+              <a:t>1/27/2020</a:t>
             </a:fld>
             <a:endParaRPr lang="en-US">
               <a:latin typeface="Garamond" charset="0"/>
@@ -45319,7 +45414,7 @@
               <a:rPr lang="en-US" smtClean="0">
                 <a:latin typeface="Garamond" charset="0"/>
               </a:rPr>
-              <a:t>9/8/2019</a:t>
+              <a:t>1/27/2020</a:t>
             </a:fld>
             <a:endParaRPr lang="en-US">
               <a:latin typeface="Garamond" charset="0"/>
@@ -45419,7 +45514,7 @@
         <p:spPr/>
         <p:txBody>
           <a:bodyPr>
-            <a:normAutofit fontScale="92500" lnSpcReduction="10000"/>
+            <a:normAutofit fontScale="92500" lnSpcReduction="20000"/>
           </a:bodyPr>
           <a:lstStyle/>
           <a:p>
@@ -45478,7 +45573,7 @@
             <a:pPr lvl="1"/>
             <a:r>
               <a:rPr lang="en-US" altLang="en-US" dirty="0"/>
-              <a:t>Text exercises: Ch. 1 due today, Ch. 2 due 9/18</a:t>
+              <a:t>Text exercises: Ch. 1 due today (1/27), Ch. 2 due 1/31</a:t>
             </a:r>
           </a:p>
           <a:p>
@@ -45496,7 +45591,7 @@
             <a:pPr lvl="1"/>
             <a:r>
               <a:rPr lang="en-US" dirty="0"/>
-              <a:t>Program 1 due Wednesday, 9/11</a:t>
+              <a:t>Program 1 due Wednesday, 1/29</a:t>
             </a:r>
           </a:p>
           <a:p>
@@ -45541,6 +45636,17 @@
               <a:rPr lang="en-US" altLang="en-US" dirty="0"/>
               <a:t>For programs, don’t forget style assessment “assignment”</a:t>
             </a:r>
+          </a:p>
+          <a:p>
+            <a:pPr lvl="1"/>
+            <a:r>
+              <a:rPr lang="en-US" dirty="0"/>
+              <a:t>Dr. Geiger’s Tuesday office hours moved to 10:30-12</a:t>
+            </a:r>
+          </a:p>
+          <a:p>
+            <a:pPr lvl="1"/>
+            <a:endParaRPr lang="en-US" altLang="en-US" dirty="0"/>
           </a:p>
           <a:p>
             <a:pPr lvl="1"/>
@@ -45685,7 +45791,7 @@
               <a:rPr lang="en-US" smtClean="0">
                 <a:latin typeface="Garamond" charset="0"/>
               </a:rPr>
-              <a:t>9/8/2019</a:t>
+              <a:t>1/27/2020</a:t>
             </a:fld>
             <a:endParaRPr lang="en-US">
               <a:latin typeface="Garamond" charset="0"/>
@@ -46281,7 +46387,7 @@
               <a:rPr lang="en-US" altLang="en-US" sz="1200" smtClean="0">
                 <a:latin typeface="Garamond" panose="02020404030301010803" pitchFamily="18" charset="0"/>
               </a:rPr>
-              <a:t>9/8/2019</a:t>
+              <a:t>1/27/2020</a:t>
             </a:fld>
             <a:endParaRPr lang="en-US" altLang="en-US" sz="1200">
               <a:latin typeface="Garamond" panose="02020404030301010803" pitchFamily="18" charset="0"/>
@@ -47189,7 +47295,7 @@
               <a:rPr lang="en-US" smtClean="0">
                 <a:latin typeface="+mj-lt"/>
               </a:rPr>
-              <a:t>9/8/2019</a:t>
+              <a:t>1/27/2020</a:t>
             </a:fld>
             <a:endParaRPr lang="en-US" dirty="0">
               <a:latin typeface="+mj-lt"/>
@@ -47633,7 +47739,7 @@
               <a:rPr lang="en-US" sz="1200" smtClean="0">
                 <a:latin typeface="Garamond" charset="0"/>
               </a:rPr>
-              <a:t>9/8/2019</a:t>
+              <a:t>1/27/2020</a:t>
             </a:fld>
             <a:endParaRPr lang="en-US" sz="1200">
               <a:latin typeface="Garamond" charset="0"/>
@@ -48295,7 +48401,7 @@
               <a:rPr lang="en-US" sz="1200" smtClean="0">
                 <a:latin typeface="Garamond" charset="0"/>
               </a:rPr>
-              <a:t>9/8/2019</a:t>
+              <a:t>1/27/2020</a:t>
             </a:fld>
             <a:endParaRPr lang="en-US" sz="1200">
               <a:latin typeface="Garamond" charset="0"/>
@@ -48823,7 +48929,7 @@
               <a:rPr lang="en-US" sz="1200" smtClean="0">
                 <a:latin typeface="Garamond" charset="0"/>
               </a:rPr>
-              <a:t>9/8/2019</a:t>
+              <a:t>1/27/2020</a:t>
             </a:fld>
             <a:endParaRPr lang="en-US" sz="1200">
               <a:latin typeface="Garamond" charset="0"/>

</xml_diff>